<commit_message>
Modified some titles and hrefs
</commit_message>
<xml_diff>
--- a/照片比例.pptx
+++ b/照片比例.pptx
@@ -104,6 +104,11 @@
       </a:defRPr>
     </a:lvl9pPr>
   </p:defaultTextStyle>
+  <p:extLst>
+    <p:ext uri="{EFAFB233-063F-42B5-8137-9DF3F51BA10A}">
+      <p15:sldGuideLst xmlns:p15="http://schemas.microsoft.com/office/powerpoint/2012/main"/>
+    </p:ext>
+  </p:extLst>
 </p:presentation>
 </file>
 
@@ -254,7 +259,7 @@
           <a:p>
             <a:fld id="{A8B5DD81-840F-4912-849F-C33EA75D482C}" type="datetimeFigureOut">
               <a:rPr lang="zh-TW" altLang="en-US" smtClean="0"/>
-              <a:t>2023/11/28</a:t>
+              <a:t>2024/3/12</a:t>
             </a:fld>
             <a:endParaRPr lang="zh-TW" altLang="en-US"/>
           </a:p>
@@ -452,7 +457,7 @@
           <a:p>
             <a:fld id="{A8B5DD81-840F-4912-849F-C33EA75D482C}" type="datetimeFigureOut">
               <a:rPr lang="zh-TW" altLang="en-US" smtClean="0"/>
-              <a:t>2023/11/28</a:t>
+              <a:t>2024/3/12</a:t>
             </a:fld>
             <a:endParaRPr lang="zh-TW" altLang="en-US"/>
           </a:p>
@@ -660,7 +665,7 @@
           <a:p>
             <a:fld id="{A8B5DD81-840F-4912-849F-C33EA75D482C}" type="datetimeFigureOut">
               <a:rPr lang="zh-TW" altLang="en-US" smtClean="0"/>
-              <a:t>2023/11/28</a:t>
+              <a:t>2024/3/12</a:t>
             </a:fld>
             <a:endParaRPr lang="zh-TW" altLang="en-US"/>
           </a:p>
@@ -858,7 +863,7 @@
           <a:p>
             <a:fld id="{A8B5DD81-840F-4912-849F-C33EA75D482C}" type="datetimeFigureOut">
               <a:rPr lang="zh-TW" altLang="en-US" smtClean="0"/>
-              <a:t>2023/11/28</a:t>
+              <a:t>2024/3/12</a:t>
             </a:fld>
             <a:endParaRPr lang="zh-TW" altLang="en-US"/>
           </a:p>
@@ -1133,7 +1138,7 @@
           <a:p>
             <a:fld id="{A8B5DD81-840F-4912-849F-C33EA75D482C}" type="datetimeFigureOut">
               <a:rPr lang="zh-TW" altLang="en-US" smtClean="0"/>
-              <a:t>2023/11/28</a:t>
+              <a:t>2024/3/12</a:t>
             </a:fld>
             <a:endParaRPr lang="zh-TW" altLang="en-US"/>
           </a:p>
@@ -1398,7 +1403,7 @@
           <a:p>
             <a:fld id="{A8B5DD81-840F-4912-849F-C33EA75D482C}" type="datetimeFigureOut">
               <a:rPr lang="zh-TW" altLang="en-US" smtClean="0"/>
-              <a:t>2023/11/28</a:t>
+              <a:t>2024/3/12</a:t>
             </a:fld>
             <a:endParaRPr lang="zh-TW" altLang="en-US"/>
           </a:p>
@@ -1810,7 +1815,7 @@
           <a:p>
             <a:fld id="{A8B5DD81-840F-4912-849F-C33EA75D482C}" type="datetimeFigureOut">
               <a:rPr lang="zh-TW" altLang="en-US" smtClean="0"/>
-              <a:t>2023/11/28</a:t>
+              <a:t>2024/3/12</a:t>
             </a:fld>
             <a:endParaRPr lang="zh-TW" altLang="en-US"/>
           </a:p>
@@ -1951,7 +1956,7 @@
           <a:p>
             <a:fld id="{A8B5DD81-840F-4912-849F-C33EA75D482C}" type="datetimeFigureOut">
               <a:rPr lang="zh-TW" altLang="en-US" smtClean="0"/>
-              <a:t>2023/11/28</a:t>
+              <a:t>2024/3/12</a:t>
             </a:fld>
             <a:endParaRPr lang="zh-TW" altLang="en-US"/>
           </a:p>
@@ -2064,7 +2069,7 @@
           <a:p>
             <a:fld id="{A8B5DD81-840F-4912-849F-C33EA75D482C}" type="datetimeFigureOut">
               <a:rPr lang="zh-TW" altLang="en-US" smtClean="0"/>
-              <a:t>2023/11/28</a:t>
+              <a:t>2024/3/12</a:t>
             </a:fld>
             <a:endParaRPr lang="zh-TW" altLang="en-US"/>
           </a:p>
@@ -2375,7 +2380,7 @@
           <a:p>
             <a:fld id="{A8B5DD81-840F-4912-849F-C33EA75D482C}" type="datetimeFigureOut">
               <a:rPr lang="zh-TW" altLang="en-US" smtClean="0"/>
-              <a:t>2023/11/28</a:t>
+              <a:t>2024/3/12</a:t>
             </a:fld>
             <a:endParaRPr lang="zh-TW" altLang="en-US"/>
           </a:p>
@@ -2663,7 +2668,7 @@
           <a:p>
             <a:fld id="{A8B5DD81-840F-4912-849F-C33EA75D482C}" type="datetimeFigureOut">
               <a:rPr lang="zh-TW" altLang="en-US" smtClean="0"/>
-              <a:t>2023/11/28</a:t>
+              <a:t>2024/3/12</a:t>
             </a:fld>
             <a:endParaRPr lang="zh-TW" altLang="en-US"/>
           </a:p>
@@ -2904,7 +2909,7 @@
           <a:p>
             <a:fld id="{A8B5DD81-840F-4912-849F-C33EA75D482C}" type="datetimeFigureOut">
               <a:rPr lang="zh-TW" altLang="en-US" smtClean="0"/>
-              <a:t>2023/11/28</a:t>
+              <a:t>2024/3/12</a:t>
             </a:fld>
             <a:endParaRPr lang="zh-TW" altLang="en-US"/>
           </a:p>
@@ -3418,6 +3423,307 @@
           </a:p>
         </p:txBody>
       </p:sp>
+      <p:sp>
+        <p:nvSpPr>
+          <p:cNvPr id="2" name="矩形 1">
+            <a:extLst>
+              <a:ext uri="{FF2B5EF4-FFF2-40B4-BE49-F238E27FC236}">
+                <a16:creationId xmlns:a16="http://schemas.microsoft.com/office/drawing/2014/main" id="{EE6A6925-4B26-16D2-9C3F-09A0F9029898}"/>
+              </a:ext>
+            </a:extLst>
+          </p:cNvPr>
+          <p:cNvSpPr/>
+          <p:nvPr/>
+        </p:nvSpPr>
+        <p:spPr>
+          <a:xfrm>
+            <a:off x="2492928" y="1197528"/>
+            <a:ext cx="7206143" cy="4462943"/>
+          </a:xfrm>
+          <a:prstGeom prst="rect">
+            <a:avLst/>
+          </a:prstGeom>
+          <a:solidFill>
+            <a:schemeClr val="accent2">
+              <a:lumMod val="40000"/>
+              <a:lumOff val="60000"/>
+            </a:schemeClr>
+          </a:solidFill>
+        </p:spPr>
+        <p:style>
+          <a:lnRef idx="2">
+            <a:schemeClr val="accent1">
+              <a:shade val="15000"/>
+            </a:schemeClr>
+          </a:lnRef>
+          <a:fillRef idx="1">
+            <a:schemeClr val="accent1"/>
+          </a:fillRef>
+          <a:effectRef idx="0">
+            <a:schemeClr val="accent1"/>
+          </a:effectRef>
+          <a:fontRef idx="minor">
+            <a:schemeClr val="lt1"/>
+          </a:fontRef>
+        </p:style>
+        <p:txBody>
+          <a:bodyPr rtlCol="0" anchor="ctr"/>
+          <a:lstStyle/>
+          <a:p>
+            <a:pPr algn="ctr"/>
+            <a:endParaRPr lang="zh-TW" altLang="en-US" dirty="0"/>
+          </a:p>
+        </p:txBody>
+      </p:sp>
+      <p:sp>
+        <p:nvSpPr>
+          <p:cNvPr id="3" name="文字方塊 2">
+            <a:extLst>
+              <a:ext uri="{FF2B5EF4-FFF2-40B4-BE49-F238E27FC236}">
+                <a16:creationId xmlns:a16="http://schemas.microsoft.com/office/drawing/2014/main" id="{CBDF7978-D7B9-CD5A-17E0-92A350397C0B}"/>
+              </a:ext>
+            </a:extLst>
+          </p:cNvPr>
+          <p:cNvSpPr txBox="1"/>
+          <p:nvPr/>
+        </p:nvSpPr>
+        <p:spPr>
+          <a:xfrm>
+            <a:off x="3115810" y="1400624"/>
+            <a:ext cx="5960378" cy="2313454"/>
+          </a:xfrm>
+          <a:prstGeom prst="rect">
+            <a:avLst/>
+          </a:prstGeom>
+          <a:noFill/>
+        </p:spPr>
+        <p:txBody>
+          <a:bodyPr wrap="square" rtlCol="0">
+            <a:spAutoFit/>
+          </a:bodyPr>
+          <a:lstStyle/>
+          <a:p>
+            <a:pPr algn="ctr">
+              <a:lnSpc>
+                <a:spcPts val="6500"/>
+              </a:lnSpc>
+            </a:pPr>
+            <a:r>
+              <a:rPr lang="en-US" altLang="zh-TW" sz="4800" b="1" dirty="0">
+                <a:solidFill>
+                  <a:schemeClr val="accent1">
+                    <a:lumMod val="50000"/>
+                  </a:schemeClr>
+                </a:solidFill>
+                <a:latin typeface="Microsoft YaHei" panose="020B0503020204020204" pitchFamily="34" charset="-122"/>
+                <a:ea typeface="Microsoft YaHei" panose="020B0503020204020204" pitchFamily="34" charset="-122"/>
+              </a:rPr>
+              <a:t>300</a:t>
+            </a:r>
+            <a:r>
+              <a:rPr lang="zh-TW" altLang="en-US" sz="4800" b="1" dirty="0">
+                <a:solidFill>
+                  <a:schemeClr val="accent1">
+                    <a:lumMod val="50000"/>
+                  </a:schemeClr>
+                </a:solidFill>
+                <a:latin typeface="Microsoft YaHei" panose="020B0503020204020204" pitchFamily="34" charset="-122"/>
+                <a:ea typeface="Microsoft YaHei" panose="020B0503020204020204" pitchFamily="34" charset="-122"/>
+              </a:rPr>
+              <a:t> 億元</a:t>
+            </a:r>
+            <a:endParaRPr lang="en-US" altLang="zh-TW" sz="4800" b="1" dirty="0">
+              <a:solidFill>
+                <a:schemeClr val="accent1">
+                  <a:lumMod val="50000"/>
+                </a:schemeClr>
+              </a:solidFill>
+              <a:latin typeface="Microsoft YaHei" panose="020B0503020204020204" pitchFamily="34" charset="-122"/>
+              <a:ea typeface="Microsoft YaHei" panose="020B0503020204020204" pitchFamily="34" charset="-122"/>
+            </a:endParaRPr>
+          </a:p>
+          <a:p>
+            <a:pPr algn="ctr">
+              <a:lnSpc>
+                <a:spcPts val="6500"/>
+              </a:lnSpc>
+            </a:pPr>
+            <a:r>
+              <a:rPr lang="zh-TW" altLang="en-US" sz="4800" b="1" dirty="0">
+                <a:solidFill>
+                  <a:schemeClr val="accent1">
+                    <a:lumMod val="50000"/>
+                  </a:schemeClr>
+                </a:solidFill>
+                <a:latin typeface="Microsoft YaHei" panose="020B0503020204020204" pitchFamily="34" charset="-122"/>
+                <a:ea typeface="Microsoft YaHei" panose="020B0503020204020204" pitchFamily="34" charset="-122"/>
+              </a:rPr>
+              <a:t>中央擴大租金補貼</a:t>
+            </a:r>
+            <a:endParaRPr lang="en-US" altLang="zh-TW" sz="4800" b="1" dirty="0">
+              <a:solidFill>
+                <a:schemeClr val="accent1">
+                  <a:lumMod val="50000"/>
+                </a:schemeClr>
+              </a:solidFill>
+              <a:latin typeface="Microsoft YaHei" panose="020B0503020204020204" pitchFamily="34" charset="-122"/>
+              <a:ea typeface="Microsoft YaHei" panose="020B0503020204020204" pitchFamily="34" charset="-122"/>
+            </a:endParaRPr>
+          </a:p>
+          <a:p>
+            <a:pPr algn="ctr"/>
+            <a:r>
+              <a:rPr lang="zh-TW" altLang="en-US" sz="3600" b="1" dirty="0">
+                <a:latin typeface="Microsoft YaHei" panose="020B0503020204020204" pitchFamily="34" charset="-122"/>
+                <a:ea typeface="Microsoft YaHei" panose="020B0503020204020204" pitchFamily="34" charset="-122"/>
+              </a:rPr>
+              <a:t>專案計畫</a:t>
+            </a:r>
+          </a:p>
+        </p:txBody>
+      </p:sp>
+      <p:sp>
+        <p:nvSpPr>
+          <p:cNvPr id="5" name="矩形: 圓角 4">
+            <a:extLst>
+              <a:ext uri="{FF2B5EF4-FFF2-40B4-BE49-F238E27FC236}">
+                <a16:creationId xmlns:a16="http://schemas.microsoft.com/office/drawing/2014/main" id="{EAD3A5BA-A5CD-BF0E-2D31-A2D6EF601DB4}"/>
+              </a:ext>
+            </a:extLst>
+          </p:cNvPr>
+          <p:cNvSpPr/>
+          <p:nvPr/>
+        </p:nvSpPr>
+        <p:spPr>
+          <a:xfrm>
+            <a:off x="3150065" y="3714079"/>
+            <a:ext cx="5891868" cy="1646486"/>
+          </a:xfrm>
+          <a:prstGeom prst="roundRect">
+            <a:avLst>
+              <a:gd name="adj" fmla="val 10160"/>
+            </a:avLst>
+          </a:prstGeom>
+          <a:solidFill>
+            <a:srgbClr val="FFFDEC"/>
+          </a:solidFill>
+          <a:ln>
+            <a:noFill/>
+          </a:ln>
+          <a:effectLst>
+            <a:outerShdw blurRad="50800" dist="38100" dir="2700000" algn="tl" rotWithShape="0">
+              <a:prstClr val="black">
+                <a:alpha val="40000"/>
+              </a:prstClr>
+            </a:outerShdw>
+          </a:effectLst>
+        </p:spPr>
+        <p:style>
+          <a:lnRef idx="2">
+            <a:schemeClr val="accent1">
+              <a:shade val="15000"/>
+            </a:schemeClr>
+          </a:lnRef>
+          <a:fillRef idx="1">
+            <a:schemeClr val="accent1"/>
+          </a:fillRef>
+          <a:effectRef idx="0">
+            <a:schemeClr val="accent1"/>
+          </a:effectRef>
+          <a:fontRef idx="minor">
+            <a:schemeClr val="lt1"/>
+          </a:fontRef>
+        </p:style>
+        <p:txBody>
+          <a:bodyPr rtlCol="0" anchor="ctr"/>
+          <a:lstStyle/>
+          <a:p>
+            <a:pPr algn="ctr"/>
+            <a:endParaRPr lang="zh-TW" altLang="en-US"/>
+          </a:p>
+        </p:txBody>
+      </p:sp>
+      <p:sp>
+        <p:nvSpPr>
+          <p:cNvPr id="4" name="文字方塊 3">
+            <a:extLst>
+              <a:ext uri="{FF2B5EF4-FFF2-40B4-BE49-F238E27FC236}">
+                <a16:creationId xmlns:a16="http://schemas.microsoft.com/office/drawing/2014/main" id="{4932394D-7189-6F21-6EB0-9953208CBA77}"/>
+              </a:ext>
+            </a:extLst>
+          </p:cNvPr>
+          <p:cNvSpPr txBox="1"/>
+          <p:nvPr/>
+        </p:nvSpPr>
+        <p:spPr>
+          <a:xfrm>
+            <a:off x="3150065" y="3824895"/>
+            <a:ext cx="5891868" cy="1312090"/>
+          </a:xfrm>
+          <a:prstGeom prst="rect">
+            <a:avLst/>
+          </a:prstGeom>
+          <a:noFill/>
+        </p:spPr>
+        <p:txBody>
+          <a:bodyPr wrap="square" rtlCol="0">
+            <a:spAutoFit/>
+          </a:bodyPr>
+          <a:lstStyle/>
+          <a:p>
+            <a:pPr algn="ctr">
+              <a:lnSpc>
+                <a:spcPts val="5000"/>
+              </a:lnSpc>
+            </a:pPr>
+            <a:r>
+              <a:rPr lang="en-US" altLang="zh-TW" sz="3200" b="1" dirty="0">
+                <a:solidFill>
+                  <a:srgbClr val="C00000"/>
+                </a:solidFill>
+                <a:latin typeface="Microsoft YaHei" panose="020B0503020204020204" pitchFamily="34" charset="-122"/>
+                <a:ea typeface="Microsoft YaHei" panose="020B0503020204020204" pitchFamily="34" charset="-122"/>
+              </a:rPr>
+              <a:t>18</a:t>
+            </a:r>
+            <a:r>
+              <a:rPr lang="zh-TW" altLang="en-US" sz="3200" b="1" dirty="0">
+                <a:solidFill>
+                  <a:srgbClr val="C00000"/>
+                </a:solidFill>
+                <a:latin typeface="Microsoft YaHei" panose="020B0503020204020204" pitchFamily="34" charset="-122"/>
+                <a:ea typeface="Microsoft YaHei" panose="020B0503020204020204" pitchFamily="34" charset="-122"/>
+              </a:rPr>
+              <a:t>歲以上大學生</a:t>
+            </a:r>
+            <a:r>
+              <a:rPr lang="zh-TW" altLang="en-US" sz="3200" b="1" dirty="0">
+                <a:latin typeface="Microsoft YaHei" panose="020B0503020204020204" pitchFamily="34" charset="-122"/>
+                <a:ea typeface="Microsoft YaHei" panose="020B0503020204020204" pitchFamily="34" charset="-122"/>
+              </a:rPr>
+              <a:t>校外賃居申請</a:t>
+            </a:r>
+            <a:endParaRPr lang="en-US" altLang="zh-TW" sz="3200" b="1" dirty="0">
+              <a:latin typeface="Microsoft YaHei" panose="020B0503020204020204" pitchFamily="34" charset="-122"/>
+              <a:ea typeface="Microsoft YaHei" panose="020B0503020204020204" pitchFamily="34" charset="-122"/>
+            </a:endParaRPr>
+          </a:p>
+          <a:p>
+            <a:pPr algn="ctr">
+              <a:lnSpc>
+                <a:spcPts val="5000"/>
+              </a:lnSpc>
+            </a:pPr>
+            <a:r>
+              <a:rPr lang="zh-TW" altLang="en-US" sz="3200" b="1" dirty="0">
+                <a:latin typeface="Microsoft YaHei" panose="020B0503020204020204" pitchFamily="34" charset="-122"/>
+                <a:ea typeface="Microsoft YaHei" panose="020B0503020204020204" pitchFamily="34" charset="-122"/>
+              </a:rPr>
+              <a:t>資格檢視及金額試算</a:t>
+            </a:r>
+          </a:p>
+        </p:txBody>
+      </p:sp>
     </p:spTree>
     <p:extLst>
       <p:ext uri="{BB962C8B-B14F-4D97-AF65-F5344CB8AC3E}">

</xml_diff>

<commit_message>
Added some new files and links for the page
</commit_message>
<xml_diff>
--- a/照片比例.pptx
+++ b/照片比例.pptx
@@ -259,7 +259,7 @@
           <a:p>
             <a:fld id="{A8B5DD81-840F-4912-849F-C33EA75D482C}" type="datetimeFigureOut">
               <a:rPr lang="zh-TW" altLang="en-US" smtClean="0"/>
-              <a:t>2024/3/12</a:t>
+              <a:t>2024/9/5</a:t>
             </a:fld>
             <a:endParaRPr lang="zh-TW" altLang="en-US"/>
           </a:p>
@@ -457,7 +457,7 @@
           <a:p>
             <a:fld id="{A8B5DD81-840F-4912-849F-C33EA75D482C}" type="datetimeFigureOut">
               <a:rPr lang="zh-TW" altLang="en-US" smtClean="0"/>
-              <a:t>2024/3/12</a:t>
+              <a:t>2024/9/5</a:t>
             </a:fld>
             <a:endParaRPr lang="zh-TW" altLang="en-US"/>
           </a:p>
@@ -665,7 +665,7 @@
           <a:p>
             <a:fld id="{A8B5DD81-840F-4912-849F-C33EA75D482C}" type="datetimeFigureOut">
               <a:rPr lang="zh-TW" altLang="en-US" smtClean="0"/>
-              <a:t>2024/3/12</a:t>
+              <a:t>2024/9/5</a:t>
             </a:fld>
             <a:endParaRPr lang="zh-TW" altLang="en-US"/>
           </a:p>
@@ -863,7 +863,7 @@
           <a:p>
             <a:fld id="{A8B5DD81-840F-4912-849F-C33EA75D482C}" type="datetimeFigureOut">
               <a:rPr lang="zh-TW" altLang="en-US" smtClean="0"/>
-              <a:t>2024/3/12</a:t>
+              <a:t>2024/9/5</a:t>
             </a:fld>
             <a:endParaRPr lang="zh-TW" altLang="en-US"/>
           </a:p>
@@ -1138,7 +1138,7 @@
           <a:p>
             <a:fld id="{A8B5DD81-840F-4912-849F-C33EA75D482C}" type="datetimeFigureOut">
               <a:rPr lang="zh-TW" altLang="en-US" smtClean="0"/>
-              <a:t>2024/3/12</a:t>
+              <a:t>2024/9/5</a:t>
             </a:fld>
             <a:endParaRPr lang="zh-TW" altLang="en-US"/>
           </a:p>
@@ -1403,7 +1403,7 @@
           <a:p>
             <a:fld id="{A8B5DD81-840F-4912-849F-C33EA75D482C}" type="datetimeFigureOut">
               <a:rPr lang="zh-TW" altLang="en-US" smtClean="0"/>
-              <a:t>2024/3/12</a:t>
+              <a:t>2024/9/5</a:t>
             </a:fld>
             <a:endParaRPr lang="zh-TW" altLang="en-US"/>
           </a:p>
@@ -1815,7 +1815,7 @@
           <a:p>
             <a:fld id="{A8B5DD81-840F-4912-849F-C33EA75D482C}" type="datetimeFigureOut">
               <a:rPr lang="zh-TW" altLang="en-US" smtClean="0"/>
-              <a:t>2024/3/12</a:t>
+              <a:t>2024/9/5</a:t>
             </a:fld>
             <a:endParaRPr lang="zh-TW" altLang="en-US"/>
           </a:p>
@@ -1956,7 +1956,7 @@
           <a:p>
             <a:fld id="{A8B5DD81-840F-4912-849F-C33EA75D482C}" type="datetimeFigureOut">
               <a:rPr lang="zh-TW" altLang="en-US" smtClean="0"/>
-              <a:t>2024/3/12</a:t>
+              <a:t>2024/9/5</a:t>
             </a:fld>
             <a:endParaRPr lang="zh-TW" altLang="en-US"/>
           </a:p>
@@ -2069,7 +2069,7 @@
           <a:p>
             <a:fld id="{A8B5DD81-840F-4912-849F-C33EA75D482C}" type="datetimeFigureOut">
               <a:rPr lang="zh-TW" altLang="en-US" smtClean="0"/>
-              <a:t>2024/3/12</a:t>
+              <a:t>2024/9/5</a:t>
             </a:fld>
             <a:endParaRPr lang="zh-TW" altLang="en-US"/>
           </a:p>
@@ -2380,7 +2380,7 @@
           <a:p>
             <a:fld id="{A8B5DD81-840F-4912-849F-C33EA75D482C}" type="datetimeFigureOut">
               <a:rPr lang="zh-TW" altLang="en-US" smtClean="0"/>
-              <a:t>2024/3/12</a:t>
+              <a:t>2024/9/5</a:t>
             </a:fld>
             <a:endParaRPr lang="zh-TW" altLang="en-US"/>
           </a:p>
@@ -2668,7 +2668,7 @@
           <a:p>
             <a:fld id="{A8B5DD81-840F-4912-849F-C33EA75D482C}" type="datetimeFigureOut">
               <a:rPr lang="zh-TW" altLang="en-US" smtClean="0"/>
-              <a:t>2024/3/12</a:t>
+              <a:t>2024/9/5</a:t>
             </a:fld>
             <a:endParaRPr lang="zh-TW" altLang="en-US"/>
           </a:p>
@@ -2909,7 +2909,7 @@
           <a:p>
             <a:fld id="{A8B5DD81-840F-4912-849F-C33EA75D482C}" type="datetimeFigureOut">
               <a:rPr lang="zh-TW" altLang="en-US" smtClean="0"/>
-              <a:t>2024/3/12</a:t>
+              <a:t>2024/9/5</a:t>
             </a:fld>
             <a:endParaRPr lang="zh-TW" altLang="en-US"/>
           </a:p>
@@ -3328,55 +3328,6 @@
       </p:grpSpPr>
       <p:sp>
         <p:nvSpPr>
-          <p:cNvPr id="6" name="矩形 5">
-            <a:extLst>
-              <a:ext uri="{FF2B5EF4-FFF2-40B4-BE49-F238E27FC236}">
-                <a16:creationId xmlns:a16="http://schemas.microsoft.com/office/drawing/2014/main" id="{3B68DF15-2BE5-52C6-160C-90837CFAC573}"/>
-              </a:ext>
-            </a:extLst>
-          </p:cNvPr>
-          <p:cNvSpPr/>
-          <p:nvPr/>
-        </p:nvSpPr>
-        <p:spPr>
-          <a:xfrm>
-            <a:off x="0" y="0"/>
-            <a:ext cx="12192000" cy="6858000"/>
-          </a:xfrm>
-          <a:prstGeom prst="rect">
-            <a:avLst/>
-          </a:prstGeom>
-          <a:solidFill>
-            <a:srgbClr val="FFFDEC"/>
-          </a:solidFill>
-        </p:spPr>
-        <p:style>
-          <a:lnRef idx="2">
-            <a:schemeClr val="accent1">
-              <a:shade val="15000"/>
-            </a:schemeClr>
-          </a:lnRef>
-          <a:fillRef idx="1">
-            <a:schemeClr val="accent1"/>
-          </a:fillRef>
-          <a:effectRef idx="0">
-            <a:schemeClr val="accent1"/>
-          </a:effectRef>
-          <a:fontRef idx="minor">
-            <a:schemeClr val="lt1"/>
-          </a:fontRef>
-        </p:style>
-        <p:txBody>
-          <a:bodyPr rtlCol="0" anchor="ctr"/>
-          <a:lstStyle/>
-          <a:p>
-            <a:pPr algn="ctr"/>
-            <a:endParaRPr lang="zh-TW" altLang="en-US"/>
-          </a:p>
-        </p:txBody>
-      </p:sp>
-      <p:sp>
-        <p:nvSpPr>
           <p:cNvPr id="13" name="矩形 12">
             <a:extLst>
               <a:ext uri="{FF2B5EF4-FFF2-40B4-BE49-F238E27FC236}">
@@ -3444,9 +3395,9 @@
             <a:avLst/>
           </a:prstGeom>
           <a:solidFill>
-            <a:schemeClr val="accent2">
-              <a:lumMod val="40000"/>
-              <a:lumOff val="60000"/>
+            <a:schemeClr val="accent5">
+              <a:lumMod val="20000"/>
+              <a:lumOff val="80000"/>
             </a:schemeClr>
           </a:solidFill>
         </p:spPr>
@@ -3489,8 +3440,8 @@
         </p:nvSpPr>
         <p:spPr>
           <a:xfrm>
-            <a:off x="3115810" y="1400624"/>
-            <a:ext cx="5960378" cy="2313454"/>
+            <a:off x="3115810" y="1776604"/>
+            <a:ext cx="5960378" cy="1479892"/>
           </a:xfrm>
           <a:prstGeom prst="rect">
             <a:avLst/>
@@ -3508,18 +3459,6 @@
                 <a:spcPts val="6500"/>
               </a:lnSpc>
             </a:pPr>
-            <a:r>
-              <a:rPr lang="en-US" altLang="zh-TW" sz="4800" b="1" dirty="0">
-                <a:solidFill>
-                  <a:schemeClr val="accent1">
-                    <a:lumMod val="50000"/>
-                  </a:schemeClr>
-                </a:solidFill>
-                <a:latin typeface="Microsoft YaHei" panose="020B0503020204020204" pitchFamily="34" charset="-122"/>
-                <a:ea typeface="Microsoft YaHei" panose="020B0503020204020204" pitchFamily="34" charset="-122"/>
-              </a:rPr>
-              <a:t>300</a:t>
-            </a:r>
             <a:r>
               <a:rPr lang="zh-TW" altLang="en-US" sz="4800" b="1" dirty="0">
                 <a:solidFill>
@@ -3530,7 +3469,7 @@
                 <a:latin typeface="Microsoft YaHei" panose="020B0503020204020204" pitchFamily="34" charset="-122"/>
                 <a:ea typeface="Microsoft YaHei" panose="020B0503020204020204" pitchFamily="34" charset="-122"/>
               </a:rPr>
-              <a:t> 億元</a:t>
+              <a:t>新北市青年租金補貼</a:t>
             </a:r>
             <a:endParaRPr lang="en-US" altLang="zh-TW" sz="4800" b="1" dirty="0">
               <a:solidFill>
@@ -3543,34 +3482,6 @@
             </a:endParaRPr>
           </a:p>
           <a:p>
-            <a:pPr algn="ctr">
-              <a:lnSpc>
-                <a:spcPts val="6500"/>
-              </a:lnSpc>
-            </a:pPr>
-            <a:r>
-              <a:rPr lang="zh-TW" altLang="en-US" sz="4800" b="1" dirty="0">
-                <a:solidFill>
-                  <a:schemeClr val="accent1">
-                    <a:lumMod val="50000"/>
-                  </a:schemeClr>
-                </a:solidFill>
-                <a:latin typeface="Microsoft YaHei" panose="020B0503020204020204" pitchFamily="34" charset="-122"/>
-                <a:ea typeface="Microsoft YaHei" panose="020B0503020204020204" pitchFamily="34" charset="-122"/>
-              </a:rPr>
-              <a:t>中央擴大租金補貼</a:t>
-            </a:r>
-            <a:endParaRPr lang="en-US" altLang="zh-TW" sz="4800" b="1" dirty="0">
-              <a:solidFill>
-                <a:schemeClr val="accent1">
-                  <a:lumMod val="50000"/>
-                </a:schemeClr>
-              </a:solidFill>
-              <a:latin typeface="Microsoft YaHei" panose="020B0503020204020204" pitchFamily="34" charset="-122"/>
-              <a:ea typeface="Microsoft YaHei" panose="020B0503020204020204" pitchFamily="34" charset="-122"/>
-            </a:endParaRPr>
-          </a:p>
-          <a:p>
             <a:pPr algn="ctr"/>
             <a:r>
               <a:rPr lang="zh-TW" altLang="en-US" sz="3600" b="1" dirty="0">
@@ -3596,7 +3507,7 @@
         </p:nvSpPr>
         <p:spPr>
           <a:xfrm>
-            <a:off x="3150065" y="3714079"/>
+            <a:off x="3150065" y="3601505"/>
             <a:ext cx="5891868" cy="1646486"/>
           </a:xfrm>
           <a:prstGeom prst="roundRect">
@@ -3657,7 +3568,7 @@
         </p:nvSpPr>
         <p:spPr>
           <a:xfrm>
-            <a:off x="3150065" y="3824895"/>
+            <a:off x="3150065" y="3712321"/>
             <a:ext cx="5891868" cy="1312090"/>
           </a:xfrm>
           <a:prstGeom prst="rect">
@@ -3679,47 +3590,164 @@
             <a:r>
               <a:rPr lang="en-US" altLang="zh-TW" sz="3200" b="1" dirty="0">
                 <a:solidFill>
-                  <a:srgbClr val="C00000"/>
+                  <a:srgbClr val="0070C0"/>
                 </a:solidFill>
                 <a:latin typeface="Microsoft YaHei" panose="020B0503020204020204" pitchFamily="34" charset="-122"/>
                 <a:ea typeface="Microsoft YaHei" panose="020B0503020204020204" pitchFamily="34" charset="-122"/>
               </a:rPr>
-              <a:t>18</a:t>
+              <a:t>112</a:t>
             </a:r>
             <a:r>
               <a:rPr lang="zh-TW" altLang="en-US" sz="3200" b="1" dirty="0">
                 <a:solidFill>
-                  <a:srgbClr val="C00000"/>
+                  <a:srgbClr val="0070C0"/>
                 </a:solidFill>
                 <a:latin typeface="Microsoft YaHei" panose="020B0503020204020204" pitchFamily="34" charset="-122"/>
                 <a:ea typeface="Microsoft YaHei" panose="020B0503020204020204" pitchFamily="34" charset="-122"/>
               </a:rPr>
-              <a:t>歲以上大學生</a:t>
+              <a:t>年</a:t>
+            </a:r>
+            <a:r>
+              <a:rPr lang="en-US" altLang="zh-TW" sz="3200" b="1" dirty="0">
+                <a:solidFill>
+                  <a:srgbClr val="0070C0"/>
+                </a:solidFill>
+                <a:latin typeface="Microsoft YaHei" panose="020B0503020204020204" pitchFamily="34" charset="-122"/>
+                <a:ea typeface="Microsoft YaHei" panose="020B0503020204020204" pitchFamily="34" charset="-122"/>
+              </a:rPr>
+              <a:t>10</a:t>
+            </a:r>
+            <a:r>
+              <a:rPr lang="zh-TW" altLang="en-US" sz="3200" b="1" dirty="0">
+                <a:solidFill>
+                  <a:srgbClr val="0070C0"/>
+                </a:solidFill>
+                <a:latin typeface="Microsoft YaHei" panose="020B0503020204020204" pitchFamily="34" charset="-122"/>
+                <a:ea typeface="Microsoft YaHei" panose="020B0503020204020204" pitchFamily="34" charset="-122"/>
+              </a:rPr>
+              <a:t>月</a:t>
+            </a:r>
+            <a:r>
+              <a:rPr lang="en-US" altLang="zh-TW" sz="3200" b="1" dirty="0">
+                <a:solidFill>
+                  <a:srgbClr val="0070C0"/>
+                </a:solidFill>
+                <a:latin typeface="Microsoft YaHei" panose="020B0503020204020204" pitchFamily="34" charset="-122"/>
+                <a:ea typeface="Microsoft YaHei" panose="020B0503020204020204" pitchFamily="34" charset="-122"/>
+              </a:rPr>
+              <a:t>2</a:t>
+            </a:r>
+            <a:r>
+              <a:rPr lang="zh-TW" altLang="en-US" sz="3200" b="1" dirty="0">
+                <a:solidFill>
+                  <a:srgbClr val="0070C0"/>
+                </a:solidFill>
+                <a:latin typeface="Microsoft YaHei" panose="020B0503020204020204" pitchFamily="34" charset="-122"/>
+                <a:ea typeface="Microsoft YaHei" panose="020B0503020204020204" pitchFamily="34" charset="-122"/>
+              </a:rPr>
+              <a:t>日</a:t>
             </a:r>
             <a:r>
               <a:rPr lang="zh-TW" altLang="en-US" sz="3200" b="1" dirty="0">
                 <a:latin typeface="Microsoft YaHei" panose="020B0503020204020204" pitchFamily="34" charset="-122"/>
                 <a:ea typeface="Microsoft YaHei" panose="020B0503020204020204" pitchFamily="34" charset="-122"/>
               </a:rPr>
-              <a:t>校外賃居申請</a:t>
-            </a:r>
-            <a:endParaRPr lang="en-US" altLang="zh-TW" sz="3200" b="1" dirty="0">
-              <a:latin typeface="Microsoft YaHei" panose="020B0503020204020204" pitchFamily="34" charset="-122"/>
-              <a:ea typeface="Microsoft YaHei" panose="020B0503020204020204" pitchFamily="34" charset="-122"/>
-            </a:endParaRPr>
-          </a:p>
-          <a:p>
-            <a:pPr algn="ctr">
-              <a:lnSpc>
-                <a:spcPts val="5000"/>
-              </a:lnSpc>
-            </a:pPr>
+              <a:t>上午</a:t>
+            </a:r>
+            <a:r>
+              <a:rPr lang="en-US" altLang="zh-TW" sz="3200" b="1" dirty="0">
+                <a:latin typeface="Microsoft YaHei" panose="020B0503020204020204" pitchFamily="34" charset="-122"/>
+                <a:ea typeface="Microsoft YaHei" panose="020B0503020204020204" pitchFamily="34" charset="-122"/>
+              </a:rPr>
+              <a:t>9</a:t>
+            </a:r>
             <a:r>
               <a:rPr lang="zh-TW" altLang="en-US" sz="3200" b="1" dirty="0">
                 <a:latin typeface="Microsoft YaHei" panose="020B0503020204020204" pitchFamily="34" charset="-122"/>
                 <a:ea typeface="Microsoft YaHei" panose="020B0503020204020204" pitchFamily="34" charset="-122"/>
               </a:rPr>
-              <a:t>資格檢視及金額試算</a:t>
+              <a:t>時起至</a:t>
+            </a:r>
+            <a:r>
+              <a:rPr lang="en-US" altLang="zh-TW" sz="3200" b="1" dirty="0">
+                <a:solidFill>
+                  <a:srgbClr val="0070C0"/>
+                </a:solidFill>
+                <a:latin typeface="Microsoft YaHei" panose="020B0503020204020204" pitchFamily="34" charset="-122"/>
+                <a:ea typeface="Microsoft YaHei" panose="020B0503020204020204" pitchFamily="34" charset="-122"/>
+              </a:rPr>
+              <a:t>113</a:t>
+            </a:r>
+            <a:r>
+              <a:rPr lang="zh-TW" altLang="en-US" sz="3200" b="1" dirty="0">
+                <a:solidFill>
+                  <a:srgbClr val="0070C0"/>
+                </a:solidFill>
+                <a:latin typeface="Microsoft YaHei" panose="020B0503020204020204" pitchFamily="34" charset="-122"/>
+                <a:ea typeface="Microsoft YaHei" panose="020B0503020204020204" pitchFamily="34" charset="-122"/>
+              </a:rPr>
+              <a:t>年</a:t>
+            </a:r>
+            <a:r>
+              <a:rPr lang="en-US" altLang="zh-TW" sz="3200" b="1" dirty="0">
+                <a:solidFill>
+                  <a:srgbClr val="0070C0"/>
+                </a:solidFill>
+                <a:latin typeface="Microsoft YaHei" panose="020B0503020204020204" pitchFamily="34" charset="-122"/>
+                <a:ea typeface="Microsoft YaHei" panose="020B0503020204020204" pitchFamily="34" charset="-122"/>
+              </a:rPr>
+              <a:t>12</a:t>
+            </a:r>
+            <a:r>
+              <a:rPr lang="zh-TW" altLang="en-US" sz="3200" b="1" dirty="0">
+                <a:solidFill>
+                  <a:srgbClr val="0070C0"/>
+                </a:solidFill>
+                <a:latin typeface="Microsoft YaHei" panose="020B0503020204020204" pitchFamily="34" charset="-122"/>
+                <a:ea typeface="Microsoft YaHei" panose="020B0503020204020204" pitchFamily="34" charset="-122"/>
+              </a:rPr>
+              <a:t>月</a:t>
+            </a:r>
+            <a:r>
+              <a:rPr lang="en-US" altLang="zh-TW" sz="3200" b="1" dirty="0">
+                <a:solidFill>
+                  <a:srgbClr val="0070C0"/>
+                </a:solidFill>
+                <a:latin typeface="Microsoft YaHei" panose="020B0503020204020204" pitchFamily="34" charset="-122"/>
+                <a:ea typeface="Microsoft YaHei" panose="020B0503020204020204" pitchFamily="34" charset="-122"/>
+              </a:rPr>
+              <a:t>31</a:t>
+            </a:r>
+            <a:r>
+              <a:rPr lang="zh-TW" altLang="en-US" sz="3200" b="1" dirty="0">
+                <a:solidFill>
+                  <a:srgbClr val="0070C0"/>
+                </a:solidFill>
+                <a:latin typeface="Microsoft YaHei" panose="020B0503020204020204" pitchFamily="34" charset="-122"/>
+                <a:ea typeface="Microsoft YaHei" panose="020B0503020204020204" pitchFamily="34" charset="-122"/>
+              </a:rPr>
+              <a:t>日</a:t>
+            </a:r>
+            <a:r>
+              <a:rPr lang="zh-TW" altLang="en-US" sz="3200" b="1" dirty="0">
+                <a:latin typeface="Microsoft YaHei" panose="020B0503020204020204" pitchFamily="34" charset="-122"/>
+                <a:ea typeface="Microsoft YaHei" panose="020B0503020204020204" pitchFamily="34" charset="-122"/>
+              </a:rPr>
+              <a:t>下午</a:t>
+            </a:r>
+            <a:r>
+              <a:rPr lang="en-US" altLang="zh-TW" sz="3200" b="1" dirty="0">
+                <a:latin typeface="Microsoft YaHei" panose="020B0503020204020204" pitchFamily="34" charset="-122"/>
+                <a:ea typeface="Microsoft YaHei" panose="020B0503020204020204" pitchFamily="34" charset="-122"/>
+              </a:rPr>
+              <a:t>5</a:t>
+            </a:r>
+            <a:r>
+              <a:rPr lang="zh-TW" altLang="en-US" sz="3200" b="1" dirty="0">
+                <a:latin typeface="Microsoft YaHei" panose="020B0503020204020204" pitchFamily="34" charset="-122"/>
+                <a:ea typeface="Microsoft YaHei" panose="020B0503020204020204" pitchFamily="34" charset="-122"/>
+              </a:rPr>
+              <a:t>時止</a:t>
             </a:r>
           </a:p>
         </p:txBody>

</xml_diff>

<commit_message>
Finished replacing some pictures in index_main
</commit_message>
<xml_diff>
--- a/照片比例.pptx
+++ b/照片比例.pptx
@@ -259,7 +259,7 @@
           <a:p>
             <a:fld id="{A8B5DD81-840F-4912-849F-C33EA75D482C}" type="datetimeFigureOut">
               <a:rPr lang="zh-TW" altLang="en-US" smtClean="0"/>
-              <a:t>2024/9/5</a:t>
+              <a:t>2024/9/10</a:t>
             </a:fld>
             <a:endParaRPr lang="zh-TW" altLang="en-US"/>
           </a:p>
@@ -457,7 +457,7 @@
           <a:p>
             <a:fld id="{A8B5DD81-840F-4912-849F-C33EA75D482C}" type="datetimeFigureOut">
               <a:rPr lang="zh-TW" altLang="en-US" smtClean="0"/>
-              <a:t>2024/9/5</a:t>
+              <a:t>2024/9/10</a:t>
             </a:fld>
             <a:endParaRPr lang="zh-TW" altLang="en-US"/>
           </a:p>
@@ -665,7 +665,7 @@
           <a:p>
             <a:fld id="{A8B5DD81-840F-4912-849F-C33EA75D482C}" type="datetimeFigureOut">
               <a:rPr lang="zh-TW" altLang="en-US" smtClean="0"/>
-              <a:t>2024/9/5</a:t>
+              <a:t>2024/9/10</a:t>
             </a:fld>
             <a:endParaRPr lang="zh-TW" altLang="en-US"/>
           </a:p>
@@ -863,7 +863,7 @@
           <a:p>
             <a:fld id="{A8B5DD81-840F-4912-849F-C33EA75D482C}" type="datetimeFigureOut">
               <a:rPr lang="zh-TW" altLang="en-US" smtClean="0"/>
-              <a:t>2024/9/5</a:t>
+              <a:t>2024/9/10</a:t>
             </a:fld>
             <a:endParaRPr lang="zh-TW" altLang="en-US"/>
           </a:p>
@@ -1138,7 +1138,7 @@
           <a:p>
             <a:fld id="{A8B5DD81-840F-4912-849F-C33EA75D482C}" type="datetimeFigureOut">
               <a:rPr lang="zh-TW" altLang="en-US" smtClean="0"/>
-              <a:t>2024/9/5</a:t>
+              <a:t>2024/9/10</a:t>
             </a:fld>
             <a:endParaRPr lang="zh-TW" altLang="en-US"/>
           </a:p>
@@ -1403,7 +1403,7 @@
           <a:p>
             <a:fld id="{A8B5DD81-840F-4912-849F-C33EA75D482C}" type="datetimeFigureOut">
               <a:rPr lang="zh-TW" altLang="en-US" smtClean="0"/>
-              <a:t>2024/9/5</a:t>
+              <a:t>2024/9/10</a:t>
             </a:fld>
             <a:endParaRPr lang="zh-TW" altLang="en-US"/>
           </a:p>
@@ -1815,7 +1815,7 @@
           <a:p>
             <a:fld id="{A8B5DD81-840F-4912-849F-C33EA75D482C}" type="datetimeFigureOut">
               <a:rPr lang="zh-TW" altLang="en-US" smtClean="0"/>
-              <a:t>2024/9/5</a:t>
+              <a:t>2024/9/10</a:t>
             </a:fld>
             <a:endParaRPr lang="zh-TW" altLang="en-US"/>
           </a:p>
@@ -1956,7 +1956,7 @@
           <a:p>
             <a:fld id="{A8B5DD81-840F-4912-849F-C33EA75D482C}" type="datetimeFigureOut">
               <a:rPr lang="zh-TW" altLang="en-US" smtClean="0"/>
-              <a:t>2024/9/5</a:t>
+              <a:t>2024/9/10</a:t>
             </a:fld>
             <a:endParaRPr lang="zh-TW" altLang="en-US"/>
           </a:p>
@@ -2069,7 +2069,7 @@
           <a:p>
             <a:fld id="{A8B5DD81-840F-4912-849F-C33EA75D482C}" type="datetimeFigureOut">
               <a:rPr lang="zh-TW" altLang="en-US" smtClean="0"/>
-              <a:t>2024/9/5</a:t>
+              <a:t>2024/9/10</a:t>
             </a:fld>
             <a:endParaRPr lang="zh-TW" altLang="en-US"/>
           </a:p>
@@ -2380,7 +2380,7 @@
           <a:p>
             <a:fld id="{A8B5DD81-840F-4912-849F-C33EA75D482C}" type="datetimeFigureOut">
               <a:rPr lang="zh-TW" altLang="en-US" smtClean="0"/>
-              <a:t>2024/9/5</a:t>
+              <a:t>2024/9/10</a:t>
             </a:fld>
             <a:endParaRPr lang="zh-TW" altLang="en-US"/>
           </a:p>
@@ -2668,7 +2668,7 @@
           <a:p>
             <a:fld id="{A8B5DD81-840F-4912-849F-C33EA75D482C}" type="datetimeFigureOut">
               <a:rPr lang="zh-TW" altLang="en-US" smtClean="0"/>
-              <a:t>2024/9/5</a:t>
+              <a:t>2024/9/10</a:t>
             </a:fld>
             <a:endParaRPr lang="zh-TW" altLang="en-US"/>
           </a:p>
@@ -2909,7 +2909,7 @@
           <a:p>
             <a:fld id="{A8B5DD81-840F-4912-849F-C33EA75D482C}" type="datetimeFigureOut">
               <a:rPr lang="zh-TW" altLang="en-US" smtClean="0"/>
-              <a:t>2024/9/5</a:t>
+              <a:t>2024/9/10</a:t>
             </a:fld>
             <a:endParaRPr lang="zh-TW" altLang="en-US"/>
           </a:p>
@@ -3328,6 +3328,55 @@
       </p:grpSpPr>
       <p:sp>
         <p:nvSpPr>
+          <p:cNvPr id="2" name="矩形 1">
+            <a:extLst>
+              <a:ext uri="{FF2B5EF4-FFF2-40B4-BE49-F238E27FC236}">
+                <a16:creationId xmlns:a16="http://schemas.microsoft.com/office/drawing/2014/main" id="{EE6A6925-4B26-16D2-9C3F-09A0F9029898}"/>
+              </a:ext>
+            </a:extLst>
+          </p:cNvPr>
+          <p:cNvSpPr/>
+          <p:nvPr/>
+        </p:nvSpPr>
+        <p:spPr>
+          <a:xfrm>
+            <a:off x="2492928" y="1197528"/>
+            <a:ext cx="7206143" cy="4462943"/>
+          </a:xfrm>
+          <a:prstGeom prst="rect">
+            <a:avLst/>
+          </a:prstGeom>
+          <a:solidFill>
+            <a:srgbClr val="FFD7D7"/>
+          </a:solidFill>
+        </p:spPr>
+        <p:style>
+          <a:lnRef idx="2">
+            <a:schemeClr val="accent1">
+              <a:shade val="15000"/>
+            </a:schemeClr>
+          </a:lnRef>
+          <a:fillRef idx="1">
+            <a:schemeClr val="accent1"/>
+          </a:fillRef>
+          <a:effectRef idx="0">
+            <a:schemeClr val="accent1"/>
+          </a:effectRef>
+          <a:fontRef idx="minor">
+            <a:schemeClr val="lt1"/>
+          </a:fontRef>
+        </p:style>
+        <p:txBody>
+          <a:bodyPr rtlCol="0" anchor="ctr"/>
+          <a:lstStyle/>
+          <a:p>
+            <a:pPr algn="ctr"/>
+            <a:endParaRPr lang="zh-TW" altLang="en-US" dirty="0"/>
+          </a:p>
+        </p:txBody>
+      </p:sp>
+      <p:sp>
+        <p:nvSpPr>
           <p:cNvPr id="13" name="矩形 12">
             <a:extLst>
               <a:ext uri="{FF2B5EF4-FFF2-40B4-BE49-F238E27FC236}">
@@ -3376,58 +3425,6 @@
       </p:sp>
       <p:sp>
         <p:nvSpPr>
-          <p:cNvPr id="2" name="矩形 1">
-            <a:extLst>
-              <a:ext uri="{FF2B5EF4-FFF2-40B4-BE49-F238E27FC236}">
-                <a16:creationId xmlns:a16="http://schemas.microsoft.com/office/drawing/2014/main" id="{EE6A6925-4B26-16D2-9C3F-09A0F9029898}"/>
-              </a:ext>
-            </a:extLst>
-          </p:cNvPr>
-          <p:cNvSpPr/>
-          <p:nvPr/>
-        </p:nvSpPr>
-        <p:spPr>
-          <a:xfrm>
-            <a:off x="2492928" y="1197528"/>
-            <a:ext cx="7206143" cy="4462943"/>
-          </a:xfrm>
-          <a:prstGeom prst="rect">
-            <a:avLst/>
-          </a:prstGeom>
-          <a:solidFill>
-            <a:schemeClr val="accent5">
-              <a:lumMod val="20000"/>
-              <a:lumOff val="80000"/>
-            </a:schemeClr>
-          </a:solidFill>
-        </p:spPr>
-        <p:style>
-          <a:lnRef idx="2">
-            <a:schemeClr val="accent1">
-              <a:shade val="15000"/>
-            </a:schemeClr>
-          </a:lnRef>
-          <a:fillRef idx="1">
-            <a:schemeClr val="accent1"/>
-          </a:fillRef>
-          <a:effectRef idx="0">
-            <a:schemeClr val="accent1"/>
-          </a:effectRef>
-          <a:fontRef idx="minor">
-            <a:schemeClr val="lt1"/>
-          </a:fontRef>
-        </p:style>
-        <p:txBody>
-          <a:bodyPr rtlCol="0" anchor="ctr"/>
-          <a:lstStyle/>
-          <a:p>
-            <a:pPr algn="ctr"/>
-            <a:endParaRPr lang="zh-TW" altLang="en-US" dirty="0"/>
-          </a:p>
-        </p:txBody>
-      </p:sp>
-      <p:sp>
-        <p:nvSpPr>
           <p:cNvPr id="3" name="文字方塊 2">
             <a:extLst>
               <a:ext uri="{FF2B5EF4-FFF2-40B4-BE49-F238E27FC236}">
@@ -3469,7 +3466,7 @@
                 <a:latin typeface="Microsoft YaHei" panose="020B0503020204020204" pitchFamily="34" charset="-122"/>
                 <a:ea typeface="Microsoft YaHei" panose="020B0503020204020204" pitchFamily="34" charset="-122"/>
               </a:rPr>
-              <a:t>新北市青年租金補貼</a:t>
+              <a:t>租賃糾紛處理管道</a:t>
             </a:r>
             <a:endParaRPr lang="en-US" altLang="zh-TW" sz="4800" b="1" dirty="0">
               <a:solidFill>
@@ -3488,7 +3485,7 @@
                 <a:latin typeface="Microsoft YaHei" panose="020B0503020204020204" pitchFamily="34" charset="-122"/>
                 <a:ea typeface="Microsoft YaHei" panose="020B0503020204020204" pitchFamily="34" charset="-122"/>
               </a:rPr>
-              <a:t>專案計畫</a:t>
+              <a:t>檔案連結</a:t>
             </a:r>
           </a:p>
         </p:txBody>
@@ -3595,7 +3592,7 @@
                 <a:latin typeface="Microsoft YaHei" panose="020B0503020204020204" pitchFamily="34" charset="-122"/>
                 <a:ea typeface="Microsoft YaHei" panose="020B0503020204020204" pitchFamily="34" charset="-122"/>
               </a:rPr>
-              <a:t>112</a:t>
+              <a:t>1999</a:t>
             </a:r>
             <a:r>
               <a:rPr lang="zh-TW" altLang="en-US" sz="3200" b="1" dirty="0">
@@ -3605,8 +3602,26 @@
                 <a:latin typeface="Microsoft YaHei" panose="020B0503020204020204" pitchFamily="34" charset="-122"/>
                 <a:ea typeface="Microsoft YaHei" panose="020B0503020204020204" pitchFamily="34" charset="-122"/>
               </a:rPr>
-              <a:t>年</a:t>
-            </a:r>
+              <a:t> </a:t>
+            </a:r>
+            <a:r>
+              <a:rPr lang="zh-TW" altLang="en-US" sz="3200" b="1" dirty="0">
+                <a:latin typeface="Microsoft YaHei" panose="020B0503020204020204" pitchFamily="34" charset="-122"/>
+                <a:ea typeface="Microsoft YaHei" panose="020B0503020204020204" pitchFamily="34" charset="-122"/>
+              </a:rPr>
+              <a:t>市府服務專線</a:t>
+            </a:r>
+            <a:endParaRPr lang="en-US" altLang="zh-TW" sz="3200" b="1" dirty="0">
+              <a:latin typeface="Microsoft YaHei" panose="020B0503020204020204" pitchFamily="34" charset="-122"/>
+              <a:ea typeface="Microsoft YaHei" panose="020B0503020204020204" pitchFamily="34" charset="-122"/>
+            </a:endParaRPr>
+          </a:p>
+          <a:p>
+            <a:pPr algn="ctr">
+              <a:lnSpc>
+                <a:spcPts val="5000"/>
+              </a:lnSpc>
+            </a:pPr>
             <a:r>
               <a:rPr lang="en-US" altLang="zh-TW" sz="3200" b="1" dirty="0">
                 <a:solidFill>
@@ -3615,118 +3630,7 @@
                 <a:latin typeface="Microsoft YaHei" panose="020B0503020204020204" pitchFamily="34" charset="-122"/>
                 <a:ea typeface="Microsoft YaHei" panose="020B0503020204020204" pitchFamily="34" charset="-122"/>
               </a:rPr>
-              <a:t>10</a:t>
-            </a:r>
-            <a:r>
-              <a:rPr lang="zh-TW" altLang="en-US" sz="3200" b="1" dirty="0">
-                <a:solidFill>
-                  <a:srgbClr val="0070C0"/>
-                </a:solidFill>
-                <a:latin typeface="Microsoft YaHei" panose="020B0503020204020204" pitchFamily="34" charset="-122"/>
-                <a:ea typeface="Microsoft YaHei" panose="020B0503020204020204" pitchFamily="34" charset="-122"/>
-              </a:rPr>
-              <a:t>月</a:t>
-            </a:r>
-            <a:r>
-              <a:rPr lang="en-US" altLang="zh-TW" sz="3200" b="1" dirty="0">
-                <a:solidFill>
-                  <a:srgbClr val="0070C0"/>
-                </a:solidFill>
-                <a:latin typeface="Microsoft YaHei" panose="020B0503020204020204" pitchFamily="34" charset="-122"/>
-                <a:ea typeface="Microsoft YaHei" panose="020B0503020204020204" pitchFamily="34" charset="-122"/>
-              </a:rPr>
-              <a:t>2</a:t>
-            </a:r>
-            <a:r>
-              <a:rPr lang="zh-TW" altLang="en-US" sz="3200" b="1" dirty="0">
-                <a:solidFill>
-                  <a:srgbClr val="0070C0"/>
-                </a:solidFill>
-                <a:latin typeface="Microsoft YaHei" panose="020B0503020204020204" pitchFamily="34" charset="-122"/>
-                <a:ea typeface="Microsoft YaHei" panose="020B0503020204020204" pitchFamily="34" charset="-122"/>
-              </a:rPr>
-              <a:t>日</a:t>
-            </a:r>
-            <a:r>
-              <a:rPr lang="zh-TW" altLang="en-US" sz="3200" b="1" dirty="0">
-                <a:latin typeface="Microsoft YaHei" panose="020B0503020204020204" pitchFamily="34" charset="-122"/>
-                <a:ea typeface="Microsoft YaHei" panose="020B0503020204020204" pitchFamily="34" charset="-122"/>
-              </a:rPr>
-              <a:t>上午</a:t>
-            </a:r>
-            <a:r>
-              <a:rPr lang="en-US" altLang="zh-TW" sz="3200" b="1" dirty="0">
-                <a:latin typeface="Microsoft YaHei" panose="020B0503020204020204" pitchFamily="34" charset="-122"/>
-                <a:ea typeface="Microsoft YaHei" panose="020B0503020204020204" pitchFamily="34" charset="-122"/>
-              </a:rPr>
-              <a:t>9</a:t>
-            </a:r>
-            <a:r>
-              <a:rPr lang="zh-TW" altLang="en-US" sz="3200" b="1" dirty="0">
-                <a:latin typeface="Microsoft YaHei" panose="020B0503020204020204" pitchFamily="34" charset="-122"/>
-                <a:ea typeface="Microsoft YaHei" panose="020B0503020204020204" pitchFamily="34" charset="-122"/>
-              </a:rPr>
-              <a:t>時起至</a:t>
-            </a:r>
-            <a:r>
-              <a:rPr lang="en-US" altLang="zh-TW" sz="3200" b="1" dirty="0">
-                <a:solidFill>
-                  <a:srgbClr val="0070C0"/>
-                </a:solidFill>
-                <a:latin typeface="Microsoft YaHei" panose="020B0503020204020204" pitchFamily="34" charset="-122"/>
-                <a:ea typeface="Microsoft YaHei" panose="020B0503020204020204" pitchFamily="34" charset="-122"/>
-              </a:rPr>
-              <a:t>113</a:t>
-            </a:r>
-            <a:r>
-              <a:rPr lang="zh-TW" altLang="en-US" sz="3200" b="1" dirty="0">
-                <a:solidFill>
-                  <a:srgbClr val="0070C0"/>
-                </a:solidFill>
-                <a:latin typeface="Microsoft YaHei" panose="020B0503020204020204" pitchFamily="34" charset="-122"/>
-                <a:ea typeface="Microsoft YaHei" panose="020B0503020204020204" pitchFamily="34" charset="-122"/>
-              </a:rPr>
-              <a:t>年</a:t>
-            </a:r>
-            <a:r>
-              <a:rPr lang="en-US" altLang="zh-TW" sz="3200" b="1" dirty="0">
-                <a:solidFill>
-                  <a:srgbClr val="0070C0"/>
-                </a:solidFill>
-                <a:latin typeface="Microsoft YaHei" panose="020B0503020204020204" pitchFamily="34" charset="-122"/>
-                <a:ea typeface="Microsoft YaHei" panose="020B0503020204020204" pitchFamily="34" charset="-122"/>
-              </a:rPr>
-              <a:t>12</a:t>
-            </a:r>
-            <a:r>
-              <a:rPr lang="zh-TW" altLang="en-US" sz="3200" b="1" dirty="0">
-                <a:solidFill>
-                  <a:srgbClr val="0070C0"/>
-                </a:solidFill>
-                <a:latin typeface="Microsoft YaHei" panose="020B0503020204020204" pitchFamily="34" charset="-122"/>
-                <a:ea typeface="Microsoft YaHei" panose="020B0503020204020204" pitchFamily="34" charset="-122"/>
-              </a:rPr>
-              <a:t>月</a:t>
-            </a:r>
-            <a:r>
-              <a:rPr lang="en-US" altLang="zh-TW" sz="3200" b="1" dirty="0">
-                <a:solidFill>
-                  <a:srgbClr val="0070C0"/>
-                </a:solidFill>
-                <a:latin typeface="Microsoft YaHei" panose="020B0503020204020204" pitchFamily="34" charset="-122"/>
-                <a:ea typeface="Microsoft YaHei" panose="020B0503020204020204" pitchFamily="34" charset="-122"/>
-              </a:rPr>
-              <a:t>31</a:t>
-            </a:r>
-            <a:r>
-              <a:rPr lang="zh-TW" altLang="en-US" sz="3200" b="1" dirty="0">
-                <a:solidFill>
-                  <a:srgbClr val="0070C0"/>
-                </a:solidFill>
-                <a:latin typeface="Microsoft YaHei" panose="020B0503020204020204" pitchFamily="34" charset="-122"/>
-                <a:ea typeface="Microsoft YaHei" panose="020B0503020204020204" pitchFamily="34" charset="-122"/>
-              </a:rPr>
-              <a:t>日</a:t>
+              <a:t>1950</a:t>
             </a:r>
             <a:r>
               <a:rPr lang="zh-TW" altLang="en-US" sz="3200" b="1" dirty="0">

</xml_diff>

<commit_message>
Modified the links in index_main
</commit_message>
<xml_diff>
--- a/照片比例.pptx
+++ b/照片比例.pptx
@@ -259,7 +259,7 @@
           <a:p>
             <a:fld id="{A8B5DD81-840F-4912-849F-C33EA75D482C}" type="datetimeFigureOut">
               <a:rPr lang="zh-TW" altLang="en-US" smtClean="0"/>
-              <a:t>2024/9/10</a:t>
+              <a:t>2024/10/17</a:t>
             </a:fld>
             <a:endParaRPr lang="zh-TW" altLang="en-US"/>
           </a:p>
@@ -457,7 +457,7 @@
           <a:p>
             <a:fld id="{A8B5DD81-840F-4912-849F-C33EA75D482C}" type="datetimeFigureOut">
               <a:rPr lang="zh-TW" altLang="en-US" smtClean="0"/>
-              <a:t>2024/9/10</a:t>
+              <a:t>2024/10/17</a:t>
             </a:fld>
             <a:endParaRPr lang="zh-TW" altLang="en-US"/>
           </a:p>
@@ -665,7 +665,7 @@
           <a:p>
             <a:fld id="{A8B5DD81-840F-4912-849F-C33EA75D482C}" type="datetimeFigureOut">
               <a:rPr lang="zh-TW" altLang="en-US" smtClean="0"/>
-              <a:t>2024/9/10</a:t>
+              <a:t>2024/10/17</a:t>
             </a:fld>
             <a:endParaRPr lang="zh-TW" altLang="en-US"/>
           </a:p>
@@ -863,7 +863,7 @@
           <a:p>
             <a:fld id="{A8B5DD81-840F-4912-849F-C33EA75D482C}" type="datetimeFigureOut">
               <a:rPr lang="zh-TW" altLang="en-US" smtClean="0"/>
-              <a:t>2024/9/10</a:t>
+              <a:t>2024/10/17</a:t>
             </a:fld>
             <a:endParaRPr lang="zh-TW" altLang="en-US"/>
           </a:p>
@@ -1138,7 +1138,7 @@
           <a:p>
             <a:fld id="{A8B5DD81-840F-4912-849F-C33EA75D482C}" type="datetimeFigureOut">
               <a:rPr lang="zh-TW" altLang="en-US" smtClean="0"/>
-              <a:t>2024/9/10</a:t>
+              <a:t>2024/10/17</a:t>
             </a:fld>
             <a:endParaRPr lang="zh-TW" altLang="en-US"/>
           </a:p>
@@ -1403,7 +1403,7 @@
           <a:p>
             <a:fld id="{A8B5DD81-840F-4912-849F-C33EA75D482C}" type="datetimeFigureOut">
               <a:rPr lang="zh-TW" altLang="en-US" smtClean="0"/>
-              <a:t>2024/9/10</a:t>
+              <a:t>2024/10/17</a:t>
             </a:fld>
             <a:endParaRPr lang="zh-TW" altLang="en-US"/>
           </a:p>
@@ -1815,7 +1815,7 @@
           <a:p>
             <a:fld id="{A8B5DD81-840F-4912-849F-C33EA75D482C}" type="datetimeFigureOut">
               <a:rPr lang="zh-TW" altLang="en-US" smtClean="0"/>
-              <a:t>2024/9/10</a:t>
+              <a:t>2024/10/17</a:t>
             </a:fld>
             <a:endParaRPr lang="zh-TW" altLang="en-US"/>
           </a:p>
@@ -1956,7 +1956,7 @@
           <a:p>
             <a:fld id="{A8B5DD81-840F-4912-849F-C33EA75D482C}" type="datetimeFigureOut">
               <a:rPr lang="zh-TW" altLang="en-US" smtClean="0"/>
-              <a:t>2024/9/10</a:t>
+              <a:t>2024/10/17</a:t>
             </a:fld>
             <a:endParaRPr lang="zh-TW" altLang="en-US"/>
           </a:p>
@@ -2069,7 +2069,7 @@
           <a:p>
             <a:fld id="{A8B5DD81-840F-4912-849F-C33EA75D482C}" type="datetimeFigureOut">
               <a:rPr lang="zh-TW" altLang="en-US" smtClean="0"/>
-              <a:t>2024/9/10</a:t>
+              <a:t>2024/10/17</a:t>
             </a:fld>
             <a:endParaRPr lang="zh-TW" altLang="en-US"/>
           </a:p>
@@ -2380,7 +2380,7 @@
           <a:p>
             <a:fld id="{A8B5DD81-840F-4912-849F-C33EA75D482C}" type="datetimeFigureOut">
               <a:rPr lang="zh-TW" altLang="en-US" smtClean="0"/>
-              <a:t>2024/9/10</a:t>
+              <a:t>2024/10/17</a:t>
             </a:fld>
             <a:endParaRPr lang="zh-TW" altLang="en-US"/>
           </a:p>
@@ -2668,7 +2668,7 @@
           <a:p>
             <a:fld id="{A8B5DD81-840F-4912-849F-C33EA75D482C}" type="datetimeFigureOut">
               <a:rPr lang="zh-TW" altLang="en-US" smtClean="0"/>
-              <a:t>2024/9/10</a:t>
+              <a:t>2024/10/17</a:t>
             </a:fld>
             <a:endParaRPr lang="zh-TW" altLang="en-US"/>
           </a:p>
@@ -2909,7 +2909,7 @@
           <a:p>
             <a:fld id="{A8B5DD81-840F-4912-849F-C33EA75D482C}" type="datetimeFigureOut">
               <a:rPr lang="zh-TW" altLang="en-US" smtClean="0"/>
-              <a:t>2024/9/10</a:t>
+              <a:t>2024/10/17</a:t>
             </a:fld>
             <a:endParaRPr lang="zh-TW" altLang="en-US"/>
           </a:p>
@@ -3347,7 +3347,10 @@
             <a:avLst/>
           </a:prstGeom>
           <a:solidFill>
-            <a:srgbClr val="FFD7D7"/>
+            <a:schemeClr val="accent5">
+              <a:lumMod val="20000"/>
+              <a:lumOff val="80000"/>
+            </a:schemeClr>
           </a:solidFill>
         </p:spPr>
         <p:style>
@@ -3466,7 +3469,7 @@
                 <a:latin typeface="Microsoft YaHei" panose="020B0503020204020204" pitchFamily="34" charset="-122"/>
                 <a:ea typeface="Microsoft YaHei" panose="020B0503020204020204" pitchFamily="34" charset="-122"/>
               </a:rPr>
-              <a:t>租賃糾紛處理管道</a:t>
+              <a:t>新北市青年租金補貼</a:t>
             </a:r>
             <a:endParaRPr lang="en-US" altLang="zh-TW" sz="4800" b="1" dirty="0">
               <a:solidFill>
@@ -3485,7 +3488,7 @@
                 <a:latin typeface="Microsoft YaHei" panose="020B0503020204020204" pitchFamily="34" charset="-122"/>
                 <a:ea typeface="Microsoft YaHei" panose="020B0503020204020204" pitchFamily="34" charset="-122"/>
               </a:rPr>
-              <a:t>檔案連結</a:t>
+              <a:t>專案計畫</a:t>
             </a:r>
           </a:p>
         </p:txBody>
@@ -3592,7 +3595,7 @@
                 <a:latin typeface="Microsoft YaHei" panose="020B0503020204020204" pitchFamily="34" charset="-122"/>
                 <a:ea typeface="Microsoft YaHei" panose="020B0503020204020204" pitchFamily="34" charset="-122"/>
               </a:rPr>
-              <a:t>1999</a:t>
+              <a:t>113</a:t>
             </a:r>
             <a:r>
               <a:rPr lang="zh-TW" altLang="en-US" sz="3200" b="1" dirty="0">
@@ -3602,26 +3605,8 @@
                 <a:latin typeface="Microsoft YaHei" panose="020B0503020204020204" pitchFamily="34" charset="-122"/>
                 <a:ea typeface="Microsoft YaHei" panose="020B0503020204020204" pitchFamily="34" charset="-122"/>
               </a:rPr>
-              <a:t> </a:t>
-            </a:r>
-            <a:r>
-              <a:rPr lang="zh-TW" altLang="en-US" sz="3200" b="1" dirty="0">
-                <a:latin typeface="Microsoft YaHei" panose="020B0503020204020204" pitchFamily="34" charset="-122"/>
-                <a:ea typeface="Microsoft YaHei" panose="020B0503020204020204" pitchFamily="34" charset="-122"/>
-              </a:rPr>
-              <a:t>市府服務專線</a:t>
-            </a:r>
-            <a:endParaRPr lang="en-US" altLang="zh-TW" sz="3200" b="1" dirty="0">
-              <a:latin typeface="Microsoft YaHei" panose="020B0503020204020204" pitchFamily="34" charset="-122"/>
-              <a:ea typeface="Microsoft YaHei" panose="020B0503020204020204" pitchFamily="34" charset="-122"/>
-            </a:endParaRPr>
-          </a:p>
-          <a:p>
-            <a:pPr algn="ctr">
-              <a:lnSpc>
-                <a:spcPts val="5000"/>
-              </a:lnSpc>
-            </a:pPr>
+              <a:t>年</a:t>
+            </a:r>
             <a:r>
               <a:rPr lang="en-US" altLang="zh-TW" sz="3200" b="1" dirty="0">
                 <a:solidFill>
@@ -3630,7 +3615,129 @@
                 <a:latin typeface="Microsoft YaHei" panose="020B0503020204020204" pitchFamily="34" charset="-122"/>
                 <a:ea typeface="Microsoft YaHei" panose="020B0503020204020204" pitchFamily="34" charset="-122"/>
               </a:rPr>
-              <a:t>1950</a:t>
+              <a:t>10</a:t>
+            </a:r>
+            <a:r>
+              <a:rPr lang="zh-TW" altLang="en-US" sz="3200" b="1" dirty="0">
+                <a:solidFill>
+                  <a:srgbClr val="0070C0"/>
+                </a:solidFill>
+                <a:latin typeface="Microsoft YaHei" panose="020B0503020204020204" pitchFamily="34" charset="-122"/>
+                <a:ea typeface="Microsoft YaHei" panose="020B0503020204020204" pitchFamily="34" charset="-122"/>
+              </a:rPr>
+              <a:t>月</a:t>
+            </a:r>
+            <a:r>
+              <a:rPr lang="en-US" altLang="zh-TW" sz="3200" b="1" dirty="0">
+                <a:solidFill>
+                  <a:srgbClr val="0070C0"/>
+                </a:solidFill>
+                <a:latin typeface="Microsoft YaHei" panose="020B0503020204020204" pitchFamily="34" charset="-122"/>
+                <a:ea typeface="Microsoft YaHei" panose="020B0503020204020204" pitchFamily="34" charset="-122"/>
+              </a:rPr>
+              <a:t>1</a:t>
+            </a:r>
+            <a:r>
+              <a:rPr lang="zh-TW" altLang="en-US" sz="3200" b="1" dirty="0">
+                <a:solidFill>
+                  <a:srgbClr val="0070C0"/>
+                </a:solidFill>
+                <a:latin typeface="Microsoft YaHei" panose="020B0503020204020204" pitchFamily="34" charset="-122"/>
+                <a:ea typeface="Microsoft YaHei" panose="020B0503020204020204" pitchFamily="34" charset="-122"/>
+              </a:rPr>
+              <a:t>日</a:t>
+            </a:r>
+            <a:r>
+              <a:rPr lang="zh-TW" altLang="en-US" sz="3200" b="1" dirty="0">
+                <a:latin typeface="Microsoft YaHei" panose="020B0503020204020204" pitchFamily="34" charset="-122"/>
+                <a:ea typeface="Microsoft YaHei" panose="020B0503020204020204" pitchFamily="34" charset="-122"/>
+              </a:rPr>
+              <a:t>上午</a:t>
+            </a:r>
+            <a:r>
+              <a:rPr lang="en-US" altLang="zh-TW" sz="3200" b="1" dirty="0">
+                <a:latin typeface="Microsoft YaHei" panose="020B0503020204020204" pitchFamily="34" charset="-122"/>
+                <a:ea typeface="Microsoft YaHei" panose="020B0503020204020204" pitchFamily="34" charset="-122"/>
+              </a:rPr>
+              <a:t>9</a:t>
+            </a:r>
+            <a:r>
+              <a:rPr lang="zh-TW" altLang="en-US" sz="3200" b="1" dirty="0">
+                <a:latin typeface="Microsoft YaHei" panose="020B0503020204020204" pitchFamily="34" charset="-122"/>
+                <a:ea typeface="Microsoft YaHei" panose="020B0503020204020204" pitchFamily="34" charset="-122"/>
+              </a:rPr>
+              <a:t>時起至</a:t>
+            </a:r>
+            <a:endParaRPr lang="en-US" altLang="zh-TW" sz="3200" b="1" dirty="0">
+              <a:latin typeface="Microsoft YaHei" panose="020B0503020204020204" pitchFamily="34" charset="-122"/>
+              <a:ea typeface="Microsoft YaHei" panose="020B0503020204020204" pitchFamily="34" charset="-122"/>
+            </a:endParaRPr>
+          </a:p>
+          <a:p>
+            <a:pPr algn="ctr">
+              <a:lnSpc>
+                <a:spcPts val="5000"/>
+              </a:lnSpc>
+            </a:pPr>
+            <a:r>
+              <a:rPr lang="en-US" altLang="zh-TW" sz="3200" b="1" dirty="0">
+                <a:solidFill>
+                  <a:srgbClr val="0070C0"/>
+                </a:solidFill>
+                <a:latin typeface="Microsoft YaHei" panose="020B0503020204020204" pitchFamily="34" charset="-122"/>
+                <a:ea typeface="Microsoft YaHei" panose="020B0503020204020204" pitchFamily="34" charset="-122"/>
+              </a:rPr>
+              <a:t>114</a:t>
+            </a:r>
+            <a:r>
+              <a:rPr lang="zh-TW" altLang="en-US" sz="3200" b="1" dirty="0">
+                <a:solidFill>
+                  <a:srgbClr val="0070C0"/>
+                </a:solidFill>
+                <a:latin typeface="Microsoft YaHei" panose="020B0503020204020204" pitchFamily="34" charset="-122"/>
+                <a:ea typeface="Microsoft YaHei" panose="020B0503020204020204" pitchFamily="34" charset="-122"/>
+              </a:rPr>
+              <a:t>年</a:t>
+            </a:r>
+            <a:r>
+              <a:rPr lang="en-US" altLang="zh-TW" sz="3200" b="1" dirty="0">
+                <a:solidFill>
+                  <a:srgbClr val="0070C0"/>
+                </a:solidFill>
+                <a:latin typeface="Microsoft YaHei" panose="020B0503020204020204" pitchFamily="34" charset="-122"/>
+                <a:ea typeface="Microsoft YaHei" panose="020B0503020204020204" pitchFamily="34" charset="-122"/>
+              </a:rPr>
+              <a:t>12</a:t>
+            </a:r>
+            <a:r>
+              <a:rPr lang="zh-TW" altLang="en-US" sz="3200" b="1" dirty="0">
+                <a:solidFill>
+                  <a:srgbClr val="0070C0"/>
+                </a:solidFill>
+                <a:latin typeface="Microsoft YaHei" panose="020B0503020204020204" pitchFamily="34" charset="-122"/>
+                <a:ea typeface="Microsoft YaHei" panose="020B0503020204020204" pitchFamily="34" charset="-122"/>
+              </a:rPr>
+              <a:t>月</a:t>
+            </a:r>
+            <a:r>
+              <a:rPr lang="en-US" altLang="zh-TW" sz="3200" b="1" dirty="0">
+                <a:solidFill>
+                  <a:srgbClr val="0070C0"/>
+                </a:solidFill>
+                <a:latin typeface="Microsoft YaHei" panose="020B0503020204020204" pitchFamily="34" charset="-122"/>
+                <a:ea typeface="Microsoft YaHei" panose="020B0503020204020204" pitchFamily="34" charset="-122"/>
+              </a:rPr>
+              <a:t>31</a:t>
+            </a:r>
+            <a:r>
+              <a:rPr lang="zh-TW" altLang="en-US" sz="3200" b="1" dirty="0">
+                <a:solidFill>
+                  <a:srgbClr val="0070C0"/>
+                </a:solidFill>
+                <a:latin typeface="Microsoft YaHei" panose="020B0503020204020204" pitchFamily="34" charset="-122"/>
+                <a:ea typeface="Microsoft YaHei" panose="020B0503020204020204" pitchFamily="34" charset="-122"/>
+              </a:rPr>
+              <a:t>日</a:t>
             </a:r>
             <a:r>
               <a:rPr lang="zh-TW" altLang="en-US" sz="3200" b="1" dirty="0">

</xml_diff>

<commit_message>
Added three new file about rent changing and checking
</commit_message>
<xml_diff>
--- a/照片比例.pptx
+++ b/照片比例.pptx
@@ -259,7 +259,7 @@
           <a:p>
             <a:fld id="{A8B5DD81-840F-4912-849F-C33EA75D482C}" type="datetimeFigureOut">
               <a:rPr lang="zh-TW" altLang="en-US" smtClean="0"/>
-              <a:t>2024/10/17</a:t>
+              <a:t>2024/11/28</a:t>
             </a:fld>
             <a:endParaRPr lang="zh-TW" altLang="en-US"/>
           </a:p>
@@ -457,7 +457,7 @@
           <a:p>
             <a:fld id="{A8B5DD81-840F-4912-849F-C33EA75D482C}" type="datetimeFigureOut">
               <a:rPr lang="zh-TW" altLang="en-US" smtClean="0"/>
-              <a:t>2024/10/17</a:t>
+              <a:t>2024/11/28</a:t>
             </a:fld>
             <a:endParaRPr lang="zh-TW" altLang="en-US"/>
           </a:p>
@@ -665,7 +665,7 @@
           <a:p>
             <a:fld id="{A8B5DD81-840F-4912-849F-C33EA75D482C}" type="datetimeFigureOut">
               <a:rPr lang="zh-TW" altLang="en-US" smtClean="0"/>
-              <a:t>2024/10/17</a:t>
+              <a:t>2024/11/28</a:t>
             </a:fld>
             <a:endParaRPr lang="zh-TW" altLang="en-US"/>
           </a:p>
@@ -863,7 +863,7 @@
           <a:p>
             <a:fld id="{A8B5DD81-840F-4912-849F-C33EA75D482C}" type="datetimeFigureOut">
               <a:rPr lang="zh-TW" altLang="en-US" smtClean="0"/>
-              <a:t>2024/10/17</a:t>
+              <a:t>2024/11/28</a:t>
             </a:fld>
             <a:endParaRPr lang="zh-TW" altLang="en-US"/>
           </a:p>
@@ -1138,7 +1138,7 @@
           <a:p>
             <a:fld id="{A8B5DD81-840F-4912-849F-C33EA75D482C}" type="datetimeFigureOut">
               <a:rPr lang="zh-TW" altLang="en-US" smtClean="0"/>
-              <a:t>2024/10/17</a:t>
+              <a:t>2024/11/28</a:t>
             </a:fld>
             <a:endParaRPr lang="zh-TW" altLang="en-US"/>
           </a:p>
@@ -1403,7 +1403,7 @@
           <a:p>
             <a:fld id="{A8B5DD81-840F-4912-849F-C33EA75D482C}" type="datetimeFigureOut">
               <a:rPr lang="zh-TW" altLang="en-US" smtClean="0"/>
-              <a:t>2024/10/17</a:t>
+              <a:t>2024/11/28</a:t>
             </a:fld>
             <a:endParaRPr lang="zh-TW" altLang="en-US"/>
           </a:p>
@@ -1815,7 +1815,7 @@
           <a:p>
             <a:fld id="{A8B5DD81-840F-4912-849F-C33EA75D482C}" type="datetimeFigureOut">
               <a:rPr lang="zh-TW" altLang="en-US" smtClean="0"/>
-              <a:t>2024/10/17</a:t>
+              <a:t>2024/11/28</a:t>
             </a:fld>
             <a:endParaRPr lang="zh-TW" altLang="en-US"/>
           </a:p>
@@ -1956,7 +1956,7 @@
           <a:p>
             <a:fld id="{A8B5DD81-840F-4912-849F-C33EA75D482C}" type="datetimeFigureOut">
               <a:rPr lang="zh-TW" altLang="en-US" smtClean="0"/>
-              <a:t>2024/10/17</a:t>
+              <a:t>2024/11/28</a:t>
             </a:fld>
             <a:endParaRPr lang="zh-TW" altLang="en-US"/>
           </a:p>
@@ -2069,7 +2069,7 @@
           <a:p>
             <a:fld id="{A8B5DD81-840F-4912-849F-C33EA75D482C}" type="datetimeFigureOut">
               <a:rPr lang="zh-TW" altLang="en-US" smtClean="0"/>
-              <a:t>2024/10/17</a:t>
+              <a:t>2024/11/28</a:t>
             </a:fld>
             <a:endParaRPr lang="zh-TW" altLang="en-US"/>
           </a:p>
@@ -2380,7 +2380,7 @@
           <a:p>
             <a:fld id="{A8B5DD81-840F-4912-849F-C33EA75D482C}" type="datetimeFigureOut">
               <a:rPr lang="zh-TW" altLang="en-US" smtClean="0"/>
-              <a:t>2024/10/17</a:t>
+              <a:t>2024/11/28</a:t>
             </a:fld>
             <a:endParaRPr lang="zh-TW" altLang="en-US"/>
           </a:p>
@@ -2668,7 +2668,7 @@
           <a:p>
             <a:fld id="{A8B5DD81-840F-4912-849F-C33EA75D482C}" type="datetimeFigureOut">
               <a:rPr lang="zh-TW" altLang="en-US" smtClean="0"/>
-              <a:t>2024/10/17</a:t>
+              <a:t>2024/11/28</a:t>
             </a:fld>
             <a:endParaRPr lang="zh-TW" altLang="en-US"/>
           </a:p>
@@ -2909,7 +2909,7 @@
           <a:p>
             <a:fld id="{A8B5DD81-840F-4912-849F-C33EA75D482C}" type="datetimeFigureOut">
               <a:rPr lang="zh-TW" altLang="en-US" smtClean="0"/>
-              <a:t>2024/10/17</a:t>
+              <a:t>2024/11/28</a:t>
             </a:fld>
             <a:endParaRPr lang="zh-TW" altLang="en-US"/>
           </a:p>
@@ -3380,54 +3380,6 @@
       </p:sp>
       <p:sp>
         <p:nvSpPr>
-          <p:cNvPr id="13" name="矩形 12">
-            <a:extLst>
-              <a:ext uri="{FF2B5EF4-FFF2-40B4-BE49-F238E27FC236}">
-                <a16:creationId xmlns:a16="http://schemas.microsoft.com/office/drawing/2014/main" id="{BE9B7DB5-3FC9-59EA-ECCD-7B38D9B4DD8C}"/>
-              </a:ext>
-            </a:extLst>
-          </p:cNvPr>
-          <p:cNvSpPr/>
-          <p:nvPr/>
-        </p:nvSpPr>
-        <p:spPr>
-          <a:xfrm>
-            <a:off x="2492928" y="1197528"/>
-            <a:ext cx="7206143" cy="4462943"/>
-          </a:xfrm>
-          <a:prstGeom prst="rect">
-            <a:avLst/>
-          </a:prstGeom>
-          <a:noFill/>
-          <a:ln w="19050"/>
-        </p:spPr>
-        <p:style>
-          <a:lnRef idx="2">
-            <a:schemeClr val="accent1">
-              <a:shade val="15000"/>
-            </a:schemeClr>
-          </a:lnRef>
-          <a:fillRef idx="1">
-            <a:schemeClr val="accent1"/>
-          </a:fillRef>
-          <a:effectRef idx="0">
-            <a:schemeClr val="accent1"/>
-          </a:effectRef>
-          <a:fontRef idx="minor">
-            <a:schemeClr val="lt1"/>
-          </a:fontRef>
-        </p:style>
-        <p:txBody>
-          <a:bodyPr rtlCol="0" anchor="ctr"/>
-          <a:lstStyle/>
-          <a:p>
-            <a:pPr algn="ctr"/>
-            <a:endParaRPr lang="zh-TW" altLang="en-US"/>
-          </a:p>
-        </p:txBody>
-      </p:sp>
-      <p:sp>
-        <p:nvSpPr>
           <p:cNvPr id="3" name="文字方塊 2">
             <a:extLst>
               <a:ext uri="{FF2B5EF4-FFF2-40B4-BE49-F238E27FC236}">
@@ -3760,6 +3712,84 @@
               </a:rPr>
               <a:t>時止</a:t>
             </a:r>
+          </a:p>
+        </p:txBody>
+      </p:sp>
+      <p:pic>
+        <p:nvPicPr>
+          <p:cNvPr id="7" name="圖片 6">
+            <a:extLst>
+              <a:ext uri="{FF2B5EF4-FFF2-40B4-BE49-F238E27FC236}">
+                <a16:creationId xmlns:a16="http://schemas.microsoft.com/office/drawing/2014/main" id="{8C098629-A8CB-32CA-FE13-C62418F6D6BD}"/>
+              </a:ext>
+            </a:extLst>
+          </p:cNvPr>
+          <p:cNvPicPr>
+            <a:picLocks noChangeAspect="1"/>
+          </p:cNvPicPr>
+          <p:nvPr/>
+        </p:nvPicPr>
+        <p:blipFill>
+          <a:blip r:embed="rId2"/>
+          <a:stretch>
+            <a:fillRect/>
+          </a:stretch>
+        </p:blipFill>
+        <p:spPr>
+          <a:xfrm>
+            <a:off x="2492928" y="1038797"/>
+            <a:ext cx="7206143" cy="5602288"/>
+          </a:xfrm>
+          <a:prstGeom prst="rect">
+            <a:avLst/>
+          </a:prstGeom>
+        </p:spPr>
+      </p:pic>
+      <p:sp>
+        <p:nvSpPr>
+          <p:cNvPr id="13" name="矩形 12">
+            <a:extLst>
+              <a:ext uri="{FF2B5EF4-FFF2-40B4-BE49-F238E27FC236}">
+                <a16:creationId xmlns:a16="http://schemas.microsoft.com/office/drawing/2014/main" id="{BE9B7DB5-3FC9-59EA-ECCD-7B38D9B4DD8C}"/>
+              </a:ext>
+            </a:extLst>
+          </p:cNvPr>
+          <p:cNvSpPr/>
+          <p:nvPr/>
+        </p:nvSpPr>
+        <p:spPr>
+          <a:xfrm>
+            <a:off x="2492928" y="1197528"/>
+            <a:ext cx="7206143" cy="4462943"/>
+          </a:xfrm>
+          <a:prstGeom prst="rect">
+            <a:avLst/>
+          </a:prstGeom>
+          <a:noFill/>
+          <a:ln w="19050"/>
+        </p:spPr>
+        <p:style>
+          <a:lnRef idx="2">
+            <a:schemeClr val="accent1">
+              <a:shade val="15000"/>
+            </a:schemeClr>
+          </a:lnRef>
+          <a:fillRef idx="1">
+            <a:schemeClr val="accent1"/>
+          </a:fillRef>
+          <a:effectRef idx="0">
+            <a:schemeClr val="accent1"/>
+          </a:effectRef>
+          <a:fontRef idx="minor">
+            <a:schemeClr val="lt1"/>
+          </a:fontRef>
+        </p:style>
+        <p:txBody>
+          <a:bodyPr rtlCol="0" anchor="ctr"/>
+          <a:lstStyle/>
+          <a:p>
+            <a:pPr algn="ctr"/>
+            <a:endParaRPr lang="zh-TW" altLang="en-US"/>
           </a:p>
         </p:txBody>
       </p:sp>

</xml_diff>